<commit_message>
Views of aircraft and updated poster with picture
</commit_message>
<xml_diff>
--- a/Mother ship poster board.pptx
+++ b/Mother ship poster board.pptx
@@ -3231,6 +3231,9 @@
           <a:p>
             <a:r>
               <a:rPr lang="en-US" sz="9600" dirty="0">
+                <a:solidFill>
+                  <a:srgbClr val="32363D"/>
+                </a:solidFill>
                 <a:latin typeface="Times New Roman" panose="02020603050405020304" pitchFamily="18" charset="0"/>
                 <a:cs typeface="Times New Roman" panose="02020603050405020304" pitchFamily="18" charset="0"/>
               </a:rPr>
@@ -3240,6 +3243,9 @@
           <a:p>
             <a:r>
               <a:rPr lang="en-US" sz="9600" dirty="0">
+                <a:solidFill>
+                  <a:srgbClr val="32363D"/>
+                </a:solidFill>
                 <a:latin typeface="Times New Roman" panose="02020603050405020304" pitchFamily="18" charset="0"/>
                 <a:cs typeface="Times New Roman" panose="02020603050405020304" pitchFamily="18" charset="0"/>
               </a:rPr>
@@ -3439,19 +3445,7 @@
             </a:lvl9pPr>
           </a:lstStyle>
           <a:p>
-            <a:r>
-              <a:rPr lang="en-US" sz="6000" dirty="0"/>
-              <a:t>*Picture of Mothership</a:t>
-            </a:r>
-          </a:p>
-          <a:p>
             <a:endParaRPr lang="en-US" sz="6000" dirty="0"/>
-          </a:p>
-          <a:p>
-            <a:r>
-              <a:rPr lang="en-US" sz="6000" dirty="0"/>
-              <a:t>Sarah</a:t>
-            </a:r>
           </a:p>
         </p:txBody>
       </p:sp>
@@ -3648,6 +3642,9 @@
           <a:p>
             <a:r>
               <a:rPr lang="en-US" sz="9600" dirty="0">
+                <a:solidFill>
+                  <a:srgbClr val="32363D"/>
+                </a:solidFill>
                 <a:latin typeface="Times New Roman" panose="02020603050405020304" pitchFamily="18" charset="0"/>
                 <a:cs typeface="Times New Roman" panose="02020603050405020304" pitchFamily="18" charset="0"/>
               </a:rPr>
@@ -3655,11 +3652,23 @@
             </a:r>
           </a:p>
           <a:p>
-            <a:endParaRPr lang="en-US" sz="9600" dirty="0"/>
-          </a:p>
-          <a:p>
-            <a:r>
-              <a:rPr lang="en-US" sz="9600" dirty="0"/>
+            <a:endParaRPr lang="en-US" sz="9600" dirty="0">
+              <a:solidFill>
+                <a:srgbClr val="32363D"/>
+              </a:solidFill>
+              <a:latin typeface="Times New Roman" panose="02020603050405020304" pitchFamily="18" charset="0"/>
+              <a:cs typeface="Times New Roman" panose="02020603050405020304" pitchFamily="18" charset="0"/>
+            </a:endParaRPr>
+          </a:p>
+          <a:p>
+            <a:r>
+              <a:rPr lang="en-US" sz="9600" dirty="0">
+                <a:solidFill>
+                  <a:srgbClr val="32363D"/>
+                </a:solidFill>
+                <a:latin typeface="Times New Roman" panose="02020603050405020304" pitchFamily="18" charset="0"/>
+                <a:cs typeface="Times New Roman" panose="02020603050405020304" pitchFamily="18" charset="0"/>
+              </a:rPr>
               <a:t>Elias</a:t>
             </a:r>
           </a:p>
@@ -4048,6 +4057,9 @@
           <a:p>
             <a:r>
               <a:rPr lang="en-US" sz="9600" dirty="0">
+                <a:solidFill>
+                  <a:srgbClr val="32363D"/>
+                </a:solidFill>
                 <a:latin typeface="Times New Roman" panose="02020603050405020304" pitchFamily="18" charset="0"/>
                 <a:cs typeface="Times New Roman" panose="02020603050405020304" pitchFamily="18" charset="0"/>
               </a:rPr>
@@ -4055,14 +4067,28 @@
             </a:r>
           </a:p>
           <a:p>
-            <a:endParaRPr lang="en-US" sz="9600" dirty="0"/>
-          </a:p>
-          <a:p>
-            <a:endParaRPr lang="en-US" sz="9600" dirty="0"/>
-          </a:p>
-          <a:p>
-            <a:r>
-              <a:rPr lang="en-US" sz="9600" dirty="0"/>
+            <a:endParaRPr lang="en-US" sz="9600" dirty="0">
+              <a:solidFill>
+                <a:srgbClr val="32363D"/>
+              </a:solidFill>
+            </a:endParaRPr>
+          </a:p>
+          <a:p>
+            <a:endParaRPr lang="en-US" sz="9600" dirty="0">
+              <a:solidFill>
+                <a:srgbClr val="32363D"/>
+              </a:solidFill>
+            </a:endParaRPr>
+          </a:p>
+          <a:p>
+            <a:r>
+              <a:rPr lang="en-US" sz="9600" dirty="0">
+                <a:solidFill>
+                  <a:srgbClr val="32363D"/>
+                </a:solidFill>
+                <a:latin typeface="Times New Roman" panose="02020603050405020304" pitchFamily="18" charset="0"/>
+                <a:cs typeface="Times New Roman" panose="02020603050405020304" pitchFamily="18" charset="0"/>
+              </a:rPr>
               <a:t>Brad</a:t>
             </a:r>
           </a:p>
@@ -4272,7 +4298,7 @@
                 <a:latin typeface="Times New Roman" panose="02020603050405020304" pitchFamily="18" charset="0"/>
                 <a:cs typeface="Times New Roman" panose="02020603050405020304" pitchFamily="18" charset="0"/>
               </a:rPr>
-              <a:t>    The aircraft is a high wing, H-tail configuration with a double carbon fiber rod boom connecting the fuselage and the tail. The glider is placed underneath the booms and connected to the fuselage. The fuselage holes all of the electronics and the motor is attached to the outside of the fuselage. The landing gear is a tail dragger configuration to allow space for the glider.</a:t>
+              <a:t>    The aircraft is a high wing, H-tail configuration with a double carbon fiber rod boom connecting the fuselage and the tail. The glider is placed underneath the booms and connected to the fuselage. The fuselage holds all of the electronics and the motor is attached to the outside of the fuselage. The landing gear is a tail dragger configuration to allow space for the glider.</a:t>
             </a:r>
             <a:endParaRPr lang="en-US" sz="8000" dirty="0">
               <a:solidFill>
@@ -4477,6 +4503,9 @@
           <a:p>
             <a:r>
               <a:rPr lang="en-US" sz="9600" dirty="0">
+                <a:solidFill>
+                  <a:srgbClr val="32363D"/>
+                </a:solidFill>
                 <a:latin typeface="Times New Roman" panose="02020603050405020304" pitchFamily="18" charset="0"/>
                 <a:cs typeface="Times New Roman" panose="02020603050405020304" pitchFamily="18" charset="0"/>
               </a:rPr>
@@ -4484,11 +4513,21 @@
             </a:r>
           </a:p>
           <a:p>
-            <a:endParaRPr lang="en-US" sz="9600" dirty="0"/>
-          </a:p>
-          <a:p>
-            <a:r>
-              <a:rPr lang="en-US" sz="9600" dirty="0"/>
+            <a:endParaRPr lang="en-US" sz="9600" dirty="0">
+              <a:solidFill>
+                <a:srgbClr val="32363D"/>
+              </a:solidFill>
+            </a:endParaRPr>
+          </a:p>
+          <a:p>
+            <a:r>
+              <a:rPr lang="en-US" sz="9600" dirty="0">
+                <a:solidFill>
+                  <a:srgbClr val="32363D"/>
+                </a:solidFill>
+                <a:latin typeface="Times New Roman" panose="02020603050405020304" pitchFamily="18" charset="0"/>
+                <a:cs typeface="Times New Roman" panose="02020603050405020304" pitchFamily="18" charset="0"/>
+              </a:rPr>
               <a:t>Veronica</a:t>
             </a:r>
           </a:p>
@@ -4687,6 +4726,9 @@
           <a:p>
             <a:r>
               <a:rPr lang="en-US" sz="9600" dirty="0">
+                <a:solidFill>
+                  <a:srgbClr val="32363D"/>
+                </a:solidFill>
                 <a:latin typeface="Times New Roman" panose="02020603050405020304" pitchFamily="18" charset="0"/>
                 <a:cs typeface="Times New Roman" panose="02020603050405020304" pitchFamily="18" charset="0"/>
               </a:rPr>
@@ -4694,11 +4736,21 @@
             </a:r>
           </a:p>
           <a:p>
-            <a:endParaRPr lang="en-US" sz="9600" dirty="0"/>
-          </a:p>
-          <a:p>
-            <a:r>
-              <a:rPr lang="en-US" sz="9600" dirty="0"/>
+            <a:endParaRPr lang="en-US" sz="9600" dirty="0">
+              <a:solidFill>
+                <a:srgbClr val="32363D"/>
+              </a:solidFill>
+            </a:endParaRPr>
+          </a:p>
+          <a:p>
+            <a:r>
+              <a:rPr lang="en-US" sz="9600" dirty="0">
+                <a:solidFill>
+                  <a:srgbClr val="32363D"/>
+                </a:solidFill>
+                <a:latin typeface="Times New Roman" panose="02020603050405020304" pitchFamily="18" charset="0"/>
+                <a:cs typeface="Times New Roman" panose="02020603050405020304" pitchFamily="18" charset="0"/>
+              </a:rPr>
               <a:t>Elias</a:t>
             </a:r>
           </a:p>
@@ -4897,6 +4949,9 @@
           <a:p>
             <a:r>
               <a:rPr lang="en-US" sz="9600" dirty="0">
+                <a:solidFill>
+                  <a:srgbClr val="32363D"/>
+                </a:solidFill>
                 <a:latin typeface="Times New Roman" panose="02020603050405020304" pitchFamily="18" charset="0"/>
                 <a:cs typeface="Times New Roman" panose="02020603050405020304" pitchFamily="18" charset="0"/>
               </a:rPr>
@@ -4904,14 +4959,32 @@
             </a:r>
           </a:p>
           <a:p>
-            <a:endParaRPr lang="en-US" sz="9600" dirty="0"/>
-          </a:p>
-          <a:p>
-            <a:endParaRPr lang="en-US" sz="9600" dirty="0"/>
-          </a:p>
-          <a:p>
-            <a:r>
-              <a:rPr lang="en-US" sz="9600" dirty="0"/>
+            <a:endParaRPr lang="en-US" sz="9600" dirty="0">
+              <a:solidFill>
+                <a:srgbClr val="32363D"/>
+              </a:solidFill>
+              <a:latin typeface="Times New Roman" panose="02020603050405020304" pitchFamily="18" charset="0"/>
+              <a:cs typeface="Times New Roman" panose="02020603050405020304" pitchFamily="18" charset="0"/>
+            </a:endParaRPr>
+          </a:p>
+          <a:p>
+            <a:endParaRPr lang="en-US" sz="9600" dirty="0">
+              <a:solidFill>
+                <a:srgbClr val="32363D"/>
+              </a:solidFill>
+              <a:latin typeface="Times New Roman" panose="02020603050405020304" pitchFamily="18" charset="0"/>
+              <a:cs typeface="Times New Roman" panose="02020603050405020304" pitchFamily="18" charset="0"/>
+            </a:endParaRPr>
+          </a:p>
+          <a:p>
+            <a:r>
+              <a:rPr lang="en-US" sz="9600" dirty="0">
+                <a:solidFill>
+                  <a:srgbClr val="32363D"/>
+                </a:solidFill>
+                <a:latin typeface="Times New Roman" panose="02020603050405020304" pitchFamily="18" charset="0"/>
+                <a:cs typeface="Times New Roman" panose="02020603050405020304" pitchFamily="18" charset="0"/>
+              </a:rPr>
               <a:t>Sean</a:t>
             </a:r>
           </a:p>
@@ -5110,6 +5183,9 @@
           <a:p>
             <a:r>
               <a:rPr lang="en-US" sz="9600" dirty="0">
+                <a:solidFill>
+                  <a:srgbClr val="32363D"/>
+                </a:solidFill>
                 <a:latin typeface="Times New Roman" panose="02020603050405020304" pitchFamily="18" charset="0"/>
                 <a:cs typeface="Times New Roman" panose="02020603050405020304" pitchFamily="18" charset="0"/>
               </a:rPr>
@@ -5117,11 +5193,21 @@
             </a:r>
           </a:p>
           <a:p>
-            <a:endParaRPr lang="en-US" sz="9600" dirty="0"/>
-          </a:p>
-          <a:p>
-            <a:r>
-              <a:rPr lang="en-US" sz="9600" dirty="0"/>
+            <a:endParaRPr lang="en-US" sz="9600" dirty="0">
+              <a:solidFill>
+                <a:srgbClr val="32363D"/>
+              </a:solidFill>
+            </a:endParaRPr>
+          </a:p>
+          <a:p>
+            <a:r>
+              <a:rPr lang="en-US" sz="9600" dirty="0">
+                <a:solidFill>
+                  <a:srgbClr val="32363D"/>
+                </a:solidFill>
+                <a:latin typeface="Times New Roman" panose="02020603050405020304" pitchFamily="18" charset="0"/>
+                <a:cs typeface="Times New Roman" panose="02020603050405020304" pitchFamily="18" charset="0"/>
+              </a:rPr>
               <a:t>Ben</a:t>
             </a:r>
           </a:p>
@@ -5929,6 +6015,42 @@
           </a:p>
         </p:txBody>
       </p:sp>
+      <p:pic>
+        <p:nvPicPr>
+          <p:cNvPr id="24" name="Picture 23">
+            <a:extLst>
+              <a:ext uri="{FF2B5EF4-FFF2-40B4-BE49-F238E27FC236}">
+                <a16:creationId xmlns:a16="http://schemas.microsoft.com/office/drawing/2014/main" id="{EFFA88B3-3EDD-4761-99B0-0313BE776317}"/>
+              </a:ext>
+            </a:extLst>
+          </p:cNvPr>
+          <p:cNvPicPr>
+            <a:picLocks noChangeAspect="1"/>
+          </p:cNvPicPr>
+          <p:nvPr/>
+        </p:nvPicPr>
+        <p:blipFill>
+          <a:blip r:embed="rId5">
+            <a:extLst>
+              <a:ext uri="{28A0092B-C50C-407E-A947-70E740481C1C}">
+                <a14:useLocalDpi xmlns:a14="http://schemas.microsoft.com/office/drawing/2010/main" val="0"/>
+              </a:ext>
+            </a:extLst>
+          </a:blip>
+          <a:stretch>
+            <a:fillRect/>
+          </a:stretch>
+        </p:blipFill>
+        <p:spPr>
+          <a:xfrm>
+            <a:off x="10363200" y="4328374"/>
+            <a:ext cx="23056567" cy="12588026"/>
+          </a:xfrm>
+          <a:prstGeom prst="rect">
+            <a:avLst/>
+          </a:prstGeom>
+        </p:spPr>
+      </p:pic>
     </p:spTree>
     <p:extLst>
       <p:ext uri="{BB962C8B-B14F-4D97-AF65-F5344CB8AC3E}">

</xml_diff>